<commit_message>
ultimo video + presentacion
</commit_message>
<xml_diff>
--- a/presentacion/presentacion.pptx
+++ b/presentacion/presentacion.pptx
@@ -158,7 +158,7 @@
           <p:cNvPr id="2" name="Marcador de encabezado 1">
             <a:extLst>
               <a:ext uri="{FF2B5EF4-FFF2-40B4-BE49-F238E27FC236}">
-                <a16:creationId xmlns:a16="http://schemas.microsoft.com/office/drawing/2014/main" id="{FF81CEA5-62FD-4C83-BDE3-91DFB9827D8F}"/>
+                <a16:creationId xmlns:a16="http://schemas.microsoft.com/office/drawing/2014/main" xmlns="" id="{FF81CEA5-62FD-4C83-BDE3-91DFB9827D8F}"/>
               </a:ext>
             </a:extLst>
           </p:cNvPr>
@@ -196,7 +196,7 @@
           <p:cNvPr id="3" name="Marcador de fecha 2">
             <a:extLst>
               <a:ext uri="{FF2B5EF4-FFF2-40B4-BE49-F238E27FC236}">
-                <a16:creationId xmlns:a16="http://schemas.microsoft.com/office/drawing/2014/main" id="{3FA1CBFD-6AD0-48C4-B91B-58830F6F4C3E}"/>
+                <a16:creationId xmlns:a16="http://schemas.microsoft.com/office/drawing/2014/main" xmlns="" id="{3FA1CBFD-6AD0-48C4-B91B-58830F6F4C3E}"/>
               </a:ext>
             </a:extLst>
           </p:cNvPr>
@@ -227,7 +227,7 @@
             <a:pPr rtl="0"/>
             <a:fld id="{C62B80FE-187A-4085-BD71-F0873FF7BD68}" type="datetime1">
               <a:rPr lang="es-ES" smtClean="0"/>
-              <a:t>10/06/2025</a:t>
+              <a:t>11/06/2025</a:t>
             </a:fld>
             <a:endParaRPr lang="es-ES"/>
           </a:p>
@@ -238,7 +238,7 @@
           <p:cNvPr id="4" name="Marcador de pie de página 3">
             <a:extLst>
               <a:ext uri="{FF2B5EF4-FFF2-40B4-BE49-F238E27FC236}">
-                <a16:creationId xmlns:a16="http://schemas.microsoft.com/office/drawing/2014/main" id="{A9E55D22-46A3-4B8C-AD40-252FE7896C36}"/>
+                <a16:creationId xmlns:a16="http://schemas.microsoft.com/office/drawing/2014/main" xmlns="" id="{A9E55D22-46A3-4B8C-AD40-252FE7896C36}"/>
               </a:ext>
             </a:extLst>
           </p:cNvPr>
@@ -276,7 +276,7 @@
           <p:cNvPr id="5" name="Marcador de número de diapositiva 4">
             <a:extLst>
               <a:ext uri="{FF2B5EF4-FFF2-40B4-BE49-F238E27FC236}">
-                <a16:creationId xmlns:a16="http://schemas.microsoft.com/office/drawing/2014/main" id="{8E70DCEF-9071-4B17-801B-37B4465C8E15}"/>
+                <a16:creationId xmlns:a16="http://schemas.microsoft.com/office/drawing/2014/main" xmlns="" id="{8E70DCEF-9071-4B17-801B-37B4465C8E15}"/>
               </a:ext>
             </a:extLst>
           </p:cNvPr>
@@ -409,7 +409,7 @@
             <a:pPr rtl="0"/>
             <a:fld id="{6D59A2BD-4571-4110-BB3E-5D004DE434FA}" type="datetime1">
               <a:rPr lang="es-ES" noProof="0" smtClean="0"/>
-              <a:t>10/06/2025</a:t>
+              <a:t>11/06/2025</a:t>
             </a:fld>
             <a:endParaRPr lang="es-ES" noProof="0"/>
           </a:p>
@@ -1183,7 +1183,7 @@
             <a:pPr rtl="0"/>
             <a:fld id="{F409C0D2-15DE-4FAC-845B-C48979FFAEB9}" type="datetime1">
               <a:rPr lang="es-ES" noProof="0" smtClean="0"/>
-              <a:t>10/06/2025</a:t>
+              <a:t>11/06/2025</a:t>
             </a:fld>
             <a:endParaRPr lang="es-ES" noProof="0"/>
           </a:p>
@@ -1448,7 +1448,7 @@
             <a:pPr rtl="0"/>
             <a:fld id="{8CF9F163-DD03-4353-882E-CE0F9A80F1C3}" type="datetime1">
               <a:rPr lang="es-ES" noProof="0" smtClean="0"/>
-              <a:t>10/06/2025</a:t>
+              <a:t>11/06/2025</a:t>
             </a:fld>
             <a:endParaRPr lang="es-ES" noProof="0"/>
           </a:p>
@@ -1686,7 +1686,7 @@
             <a:pPr rtl="0"/>
             <a:fld id="{8D2FF54C-EA2F-453C-857C-5C9ADB86CB43}" type="datetime1">
               <a:rPr lang="es-ES" noProof="0" smtClean="0"/>
-              <a:t>10/06/2025</a:t>
+              <a:t>11/06/2025</a:t>
             </a:fld>
             <a:endParaRPr lang="es-ES" noProof="0"/>
           </a:p>
@@ -1929,7 +1929,7 @@
             <a:pPr rtl="0"/>
             <a:fld id="{57670FF6-52DC-429F-9C56-6A1BF295232E}" type="datetime1">
               <a:rPr lang="es-ES" noProof="0" smtClean="0"/>
-              <a:t>10/06/2025</a:t>
+              <a:t>11/06/2025</a:t>
             </a:fld>
             <a:endParaRPr lang="es-ES" noProof="0"/>
           </a:p>
@@ -2240,7 +2240,7 @@
             <a:pPr rtl="0"/>
             <a:fld id="{85E27922-51B6-4B96-9C28-2CD2060AE75A}" type="datetime1">
               <a:rPr lang="es-ES" noProof="0" smtClean="0"/>
-              <a:t>10/06/2025</a:t>
+              <a:t>11/06/2025</a:t>
             </a:fld>
             <a:endParaRPr lang="es-ES" noProof="0"/>
           </a:p>
@@ -2544,7 +2544,7 @@
             <a:pPr rtl="0"/>
             <a:fld id="{F3ECF5D1-1C98-40FD-9D65-EED7644802B9}" type="datetime1">
               <a:rPr lang="es-ES" noProof="0" smtClean="0"/>
-              <a:t>10/06/2025</a:t>
+              <a:t>11/06/2025</a:t>
             </a:fld>
             <a:endParaRPr lang="es-ES" noProof="0"/>
           </a:p>
@@ -2968,7 +2968,7 @@
             <a:pPr rtl="0"/>
             <a:fld id="{8556C746-EB55-4634-AD93-A9FF2473885C}" type="datetime1">
               <a:rPr lang="es-ES" noProof="0" smtClean="0"/>
-              <a:t>10/06/2025</a:t>
+              <a:t>11/06/2025</a:t>
             </a:fld>
             <a:endParaRPr lang="es-ES" noProof="0"/>
           </a:p>
@@ -3067,7 +3067,7 @@
             <a:pPr rtl="0"/>
             <a:fld id="{C9051F13-F75A-440F-BED7-E2004746A95F}" type="datetime1">
               <a:rPr lang="es-ES" noProof="0" smtClean="0"/>
-              <a:t>10/06/2025</a:t>
+              <a:t>11/06/2025</a:t>
             </a:fld>
             <a:endParaRPr lang="es-ES" noProof="0"/>
           </a:p>
@@ -3233,7 +3233,7 @@
             <a:pPr rtl="0"/>
             <a:fld id="{3D7A2E7D-666A-420B-9042-959E1D47E21D}" type="datetime1">
               <a:rPr lang="es-ES" noProof="0" smtClean="0"/>
-              <a:t>10/06/2025</a:t>
+              <a:t>11/06/2025</a:t>
             </a:fld>
             <a:endParaRPr lang="es-ES" noProof="0"/>
           </a:p>
@@ -3614,7 +3614,7 @@
             <a:pPr rtl="0"/>
             <a:fld id="{0403F12F-0E67-4CAB-8DFD-26DCD4A99D59}" type="datetime1">
               <a:rPr lang="es-ES" noProof="0" smtClean="0"/>
-              <a:t>10/06/2025</a:t>
+              <a:t>11/06/2025</a:t>
             </a:fld>
             <a:endParaRPr lang="es-ES" noProof="0"/>
           </a:p>
@@ -3907,7 +3907,7 @@
             <a:pPr rtl="0"/>
             <a:fld id="{9709DA8C-1A59-4B91-B9EA-509377CD0E23}" type="datetime1">
               <a:rPr lang="es-ES" noProof="0" smtClean="0"/>
-              <a:t>10/06/2025</a:t>
+              <a:t>11/06/2025</a:t>
             </a:fld>
             <a:endParaRPr lang="es-ES" noProof="0"/>
           </a:p>
@@ -4121,7 +4121,7 @@
             <a:pPr rtl="0"/>
             <a:fld id="{A3DF7BF2-42BB-439B-88AA-F60334FF1291}" type="datetime1">
               <a:rPr lang="es-ES" noProof="0" smtClean="0"/>
-              <a:t>10/06/2025</a:t>
+              <a:t>11/06/2025</a:t>
             </a:fld>
             <a:endParaRPr lang="es-ES" noProof="0"/>
           </a:p>
@@ -4739,10 +4739,10 @@
           <p:cNvPr id="15" name="Rectángulo 14">
             <a:extLst>
               <a:ext uri="{FF2B5EF4-FFF2-40B4-BE49-F238E27FC236}">
-                <a16:creationId xmlns:a16="http://schemas.microsoft.com/office/drawing/2014/main" id="{493D4EDA-58E0-40CC-B3CA-14CDEB349D24}"/>
+                <a16:creationId xmlns:a16="http://schemas.microsoft.com/office/drawing/2014/main" xmlns="" id="{493D4EDA-58E0-40CC-B3CA-14CDEB349D24}"/>
               </a:ext>
               <a:ext uri="{C183D7F6-B498-43B3-948B-1728B52AA6E4}">
-                <adec:decorative xmlns:adec="http://schemas.microsoft.com/office/drawing/2017/decorative" val="1"/>
+                <adec:decorative xmlns:adec="http://schemas.microsoft.com/office/drawing/2017/decorative" xmlns="" val="1"/>
               </a:ext>
             </a:extLst>
           </p:cNvPr>
@@ -4752,7 +4752,7 @@
           <p:nvPr>
             <p:extLst>
               <p:ext uri="{386F3935-93C4-4BCD-93E2-E3B085C9AB24}">
-                <p16:designElem xmlns:p16="http://schemas.microsoft.com/office/powerpoint/2015/main" val="1"/>
+                <p16:designElem xmlns:p16="http://schemas.microsoft.com/office/powerpoint/2015/main" xmlns="" val="1"/>
               </p:ext>
             </p:extLst>
           </p:nvPr>
@@ -4799,7 +4799,7 @@
           <p:cNvPr id="7" name="Imagen 6" descr="Conexiones digitales">
             <a:extLst>
               <a:ext uri="{FF2B5EF4-FFF2-40B4-BE49-F238E27FC236}">
-                <a16:creationId xmlns:a16="http://schemas.microsoft.com/office/drawing/2014/main" id="{3840F91C-EDD0-4D4E-A4AB-E6C77856C88C}"/>
+                <a16:creationId xmlns:a16="http://schemas.microsoft.com/office/drawing/2014/main" xmlns="" id="{3840F91C-EDD0-4D4E-A4AB-E6C77856C88C}"/>
               </a:ext>
             </a:extLst>
           </p:cNvPr>
@@ -4834,10 +4834,10 @@
           <p:cNvPr id="17" name="Grupo 16">
             <a:extLst>
               <a:ext uri="{FF2B5EF4-FFF2-40B4-BE49-F238E27FC236}">
-                <a16:creationId xmlns:a16="http://schemas.microsoft.com/office/drawing/2014/main" id="{AA9EB0BC-A85E-4C26-B355-5DFCEF6CCB49}"/>
+                <a16:creationId xmlns:a16="http://schemas.microsoft.com/office/drawing/2014/main" xmlns="" id="{AA9EB0BC-A85E-4C26-B355-5DFCEF6CCB49}"/>
               </a:ext>
               <a:ext uri="{C183D7F6-B498-43B3-948B-1728B52AA6E4}">
-                <adec:decorative xmlns:adec="http://schemas.microsoft.com/office/drawing/2017/decorative" val="1"/>
+                <adec:decorative xmlns:adec="http://schemas.microsoft.com/office/drawing/2017/decorative" xmlns="" val="1"/>
               </a:ext>
             </a:extLst>
           </p:cNvPr>
@@ -4847,7 +4847,7 @@
           <p:nvPr>
             <p:extLst>
               <p:ext uri="{386F3935-93C4-4BCD-93E2-E3B085C9AB24}">
-                <p16:designElem xmlns:p16="http://schemas.microsoft.com/office/powerpoint/2015/main" val="1"/>
+                <p16:designElem xmlns:p16="http://schemas.microsoft.com/office/powerpoint/2015/main" xmlns="" val="1"/>
               </p:ext>
             </p:extLst>
           </p:nvPr>
@@ -4865,10 +4865,10 @@
             <p:cNvPr id="18" name="Rectángulo 17">
               <a:extLst>
                 <a:ext uri="{FF2B5EF4-FFF2-40B4-BE49-F238E27FC236}">
-                  <a16:creationId xmlns:a16="http://schemas.microsoft.com/office/drawing/2014/main" id="{3643E56B-BD42-413D-B17D-7958270F5DE4}"/>
+                  <a16:creationId xmlns:a16="http://schemas.microsoft.com/office/drawing/2014/main" xmlns="" id="{3643E56B-BD42-413D-B17D-7958270F5DE4}"/>
                 </a:ext>
                 <a:ext uri="{C183D7F6-B498-43B3-948B-1728B52AA6E4}">
-                  <adec:decorative xmlns:adec="http://schemas.microsoft.com/office/drawing/2017/decorative" val="1"/>
+                  <adec:decorative xmlns:adec="http://schemas.microsoft.com/office/drawing/2017/decorative" xmlns="" val="1"/>
                 </a:ext>
               </a:extLst>
             </p:cNvPr>
@@ -4876,7 +4876,7 @@
             <p:nvPr>
               <p:extLst>
                 <p:ext uri="{386F3935-93C4-4BCD-93E2-E3B085C9AB24}">
-                  <p16:designElem xmlns:p16="http://schemas.microsoft.com/office/powerpoint/2015/main" val="1"/>
+                  <p16:designElem xmlns:p16="http://schemas.microsoft.com/office/powerpoint/2015/main" xmlns="" val="1"/>
                 </p:ext>
               </p:extLst>
             </p:nvPr>
@@ -4924,10 +4924,10 @@
             <p:cNvPr id="19" name="Rectángulo 18">
               <a:extLst>
                 <a:ext uri="{FF2B5EF4-FFF2-40B4-BE49-F238E27FC236}">
-                  <a16:creationId xmlns:a16="http://schemas.microsoft.com/office/drawing/2014/main" id="{96C04F74-9467-4FA5-95DC-8D481A29740E}"/>
+                  <a16:creationId xmlns:a16="http://schemas.microsoft.com/office/drawing/2014/main" xmlns="" id="{96C04F74-9467-4FA5-95DC-8D481A29740E}"/>
                 </a:ext>
                 <a:ext uri="{C183D7F6-B498-43B3-948B-1728B52AA6E4}">
-                  <adec:decorative xmlns:adec="http://schemas.microsoft.com/office/drawing/2017/decorative" val="1"/>
+                  <adec:decorative xmlns:adec="http://schemas.microsoft.com/office/drawing/2017/decorative" xmlns="" val="1"/>
                 </a:ext>
               </a:extLst>
             </p:cNvPr>
@@ -4935,7 +4935,7 @@
             <p:nvPr>
               <p:extLst>
                 <p:ext uri="{386F3935-93C4-4BCD-93E2-E3B085C9AB24}">
-                  <p16:designElem xmlns:p16="http://schemas.microsoft.com/office/powerpoint/2015/main" val="1"/>
+                  <p16:designElem xmlns:p16="http://schemas.microsoft.com/office/powerpoint/2015/main" xmlns="" val="1"/>
                 </p:ext>
               </p:extLst>
             </p:nvPr>
@@ -4983,10 +4983,10 @@
             <p:cNvPr id="20" name="Rectángulo 19">
               <a:extLst>
                 <a:ext uri="{FF2B5EF4-FFF2-40B4-BE49-F238E27FC236}">
-                  <a16:creationId xmlns:a16="http://schemas.microsoft.com/office/drawing/2014/main" id="{D73DE1C3-5C37-42E9-A3F0-256F1938327C}"/>
+                  <a16:creationId xmlns:a16="http://schemas.microsoft.com/office/drawing/2014/main" xmlns="" id="{D73DE1C3-5C37-42E9-A3F0-256F1938327C}"/>
                 </a:ext>
                 <a:ext uri="{C183D7F6-B498-43B3-948B-1728B52AA6E4}">
-                  <adec:decorative xmlns:adec="http://schemas.microsoft.com/office/drawing/2017/decorative" val="1"/>
+                  <adec:decorative xmlns:adec="http://schemas.microsoft.com/office/drawing/2017/decorative" xmlns="" val="1"/>
                 </a:ext>
               </a:extLst>
             </p:cNvPr>
@@ -4994,7 +4994,7 @@
             <p:nvPr>
               <p:extLst>
                 <p:ext uri="{386F3935-93C4-4BCD-93E2-E3B085C9AB24}">
-                  <p16:designElem xmlns:p16="http://schemas.microsoft.com/office/powerpoint/2015/main" val="1"/>
+                  <p16:designElem xmlns:p16="http://schemas.microsoft.com/office/powerpoint/2015/main" xmlns="" val="1"/>
                 </p:ext>
               </p:extLst>
             </p:nvPr>
@@ -5043,10 +5043,10 @@
           <p:cNvPr id="22" name="Rectángulo 21">
             <a:extLst>
               <a:ext uri="{FF2B5EF4-FFF2-40B4-BE49-F238E27FC236}">
-                <a16:creationId xmlns:a16="http://schemas.microsoft.com/office/drawing/2014/main" id="{4A2E7EC3-E07C-46CE-9B25-41865A50681C}"/>
+                <a16:creationId xmlns:a16="http://schemas.microsoft.com/office/drawing/2014/main" xmlns="" id="{4A2E7EC3-E07C-46CE-9B25-41865A50681C}"/>
               </a:ext>
               <a:ext uri="{C183D7F6-B498-43B3-948B-1728B52AA6E4}">
-                <adec:decorative xmlns:adec="http://schemas.microsoft.com/office/drawing/2017/decorative" val="1"/>
+                <adec:decorative xmlns:adec="http://schemas.microsoft.com/office/drawing/2017/decorative" xmlns="" val="1"/>
               </a:ext>
             </a:extLst>
           </p:cNvPr>
@@ -5056,7 +5056,7 @@
           <p:nvPr>
             <p:extLst>
               <p:ext uri="{386F3935-93C4-4BCD-93E2-E3B085C9AB24}">
-                <p16:designElem xmlns:p16="http://schemas.microsoft.com/office/powerpoint/2015/main" val="1"/>
+                <p16:designElem xmlns:p16="http://schemas.microsoft.com/office/powerpoint/2015/main" xmlns="" val="1"/>
               </p:ext>
             </p:extLst>
           </p:nvPr>
@@ -5106,7 +5106,7 @@
           <p:cNvPr id="2" name="Título 1">
             <a:extLst>
               <a:ext uri="{FF2B5EF4-FFF2-40B4-BE49-F238E27FC236}">
-                <a16:creationId xmlns:a16="http://schemas.microsoft.com/office/drawing/2014/main" id="{C02C5318-1A1E-49D0-B2E2-A4B0FA9E8A40}"/>
+                <a16:creationId xmlns:a16="http://schemas.microsoft.com/office/drawing/2014/main" xmlns="" id="{C02C5318-1A1E-49D0-B2E2-A4B0FA9E8A40}"/>
               </a:ext>
             </a:extLst>
           </p:cNvPr>
@@ -5146,7 +5146,7 @@
           <p:cNvPr id="3" name="Subtítulo 2">
             <a:extLst>
               <a:ext uri="{FF2B5EF4-FFF2-40B4-BE49-F238E27FC236}">
-                <a16:creationId xmlns:a16="http://schemas.microsoft.com/office/drawing/2014/main" id="{48B6CF59-4E5B-494D-A2F7-97ADD01E6497}"/>
+                <a16:creationId xmlns:a16="http://schemas.microsoft.com/office/drawing/2014/main" xmlns="" id="{48B6CF59-4E5B-494D-A2F7-97ADD01E6497}"/>
               </a:ext>
             </a:extLst>
           </p:cNvPr>
@@ -5274,7 +5274,7 @@
           <p:cNvPr id="2" name="Título 1">
             <a:extLst>
               <a:ext uri="{FF2B5EF4-FFF2-40B4-BE49-F238E27FC236}">
-                <a16:creationId xmlns:a16="http://schemas.microsoft.com/office/drawing/2014/main" id="{B5D6FAB0-E7FF-242F-4239-E6A95ABC0E02}"/>
+                <a16:creationId xmlns:a16="http://schemas.microsoft.com/office/drawing/2014/main" xmlns="" id="{B5D6FAB0-E7FF-242F-4239-E6A95ABC0E02}"/>
               </a:ext>
             </a:extLst>
           </p:cNvPr>
@@ -5302,7 +5302,7 @@
           <p:cNvPr id="3" name="Marcador de contenido 2">
             <a:extLst>
               <a:ext uri="{FF2B5EF4-FFF2-40B4-BE49-F238E27FC236}">
-                <a16:creationId xmlns:a16="http://schemas.microsoft.com/office/drawing/2014/main" id="{8B6E21AF-079D-5EB6-90C2-45CFB644EC8E}"/>
+                <a16:creationId xmlns:a16="http://schemas.microsoft.com/office/drawing/2014/main" xmlns="" id="{8B6E21AF-079D-5EB6-90C2-45CFB644EC8E}"/>
               </a:ext>
             </a:extLst>
           </p:cNvPr>
@@ -5369,7 +5369,7 @@
           <p:cNvPr id="5" name="Imagen 4" descr="Interfaz de usuario gráfica&#10;&#10;El contenido generado por IA puede ser incorrecto.">
             <a:extLst>
               <a:ext uri="{FF2B5EF4-FFF2-40B4-BE49-F238E27FC236}">
-                <a16:creationId xmlns:a16="http://schemas.microsoft.com/office/drawing/2014/main" id="{B9882786-FBCE-7B81-BE0D-E13F95C69599}"/>
+                <a16:creationId xmlns:a16="http://schemas.microsoft.com/office/drawing/2014/main" xmlns="" id="{B9882786-FBCE-7B81-BE0D-E13F95C69599}"/>
               </a:ext>
             </a:extLst>
           </p:cNvPr>
@@ -5399,7 +5399,7 @@
           <p:cNvPr id="7" name="Imagen 6" descr="Imagen que contiene Forma&#10;&#10;El contenido generado por IA puede ser incorrecto.">
             <a:extLst>
               <a:ext uri="{FF2B5EF4-FFF2-40B4-BE49-F238E27FC236}">
-                <a16:creationId xmlns:a16="http://schemas.microsoft.com/office/drawing/2014/main" id="{81C01DDF-7911-6C65-5206-361204504157}"/>
+                <a16:creationId xmlns:a16="http://schemas.microsoft.com/office/drawing/2014/main" xmlns="" id="{81C01DDF-7911-6C65-5206-361204504157}"/>
               </a:ext>
             </a:extLst>
           </p:cNvPr>
@@ -5429,7 +5429,7 @@
           <p:cNvPr id="9" name="Imagen 8" descr="Imagen que contiene pastel, tabla, interior, taza&#10;&#10;El contenido generado por IA puede ser incorrecto.">
             <a:extLst>
               <a:ext uri="{FF2B5EF4-FFF2-40B4-BE49-F238E27FC236}">
-                <a16:creationId xmlns:a16="http://schemas.microsoft.com/office/drawing/2014/main" id="{CF7DF985-80D0-763D-3327-24D56F2FD698}"/>
+                <a16:creationId xmlns:a16="http://schemas.microsoft.com/office/drawing/2014/main" xmlns="" id="{CF7DF985-80D0-763D-3327-24D56F2FD698}"/>
               </a:ext>
             </a:extLst>
           </p:cNvPr>
@@ -5497,10 +5497,10 @@
           <p:cNvPr id="10" name="Rectángulo 9">
             <a:extLst>
               <a:ext uri="{FF2B5EF4-FFF2-40B4-BE49-F238E27FC236}">
-                <a16:creationId xmlns:a16="http://schemas.microsoft.com/office/drawing/2014/main" id="{379F11E2-8BA5-4C5C-AE7C-361E5EA011FF}"/>
+                <a16:creationId xmlns:a16="http://schemas.microsoft.com/office/drawing/2014/main" xmlns="" id="{379F11E2-8BA5-4C5C-AE7C-361E5EA011FF}"/>
               </a:ext>
               <a:ext uri="{C183D7F6-B498-43B3-948B-1728B52AA6E4}">
-                <adec:decorative xmlns:adec="http://schemas.microsoft.com/office/drawing/2017/decorative" val="1"/>
+                <adec:decorative xmlns:adec="http://schemas.microsoft.com/office/drawing/2017/decorative" xmlns="" val="1"/>
               </a:ext>
             </a:extLst>
           </p:cNvPr>
@@ -5510,7 +5510,7 @@
           <p:nvPr>
             <p:extLst>
               <p:ext uri="{386F3935-93C4-4BCD-93E2-E3B085C9AB24}">
-                <p16:designElem xmlns:p16="http://schemas.microsoft.com/office/powerpoint/2015/main" val="1"/>
+                <p16:designElem xmlns:p16="http://schemas.microsoft.com/office/powerpoint/2015/main" xmlns="" val="1"/>
               </p:ext>
             </p:extLst>
           </p:nvPr>
@@ -5557,10 +5557,10 @@
           <p:cNvPr id="12" name="Rectángulo 11">
             <a:extLst>
               <a:ext uri="{FF2B5EF4-FFF2-40B4-BE49-F238E27FC236}">
-                <a16:creationId xmlns:a16="http://schemas.microsoft.com/office/drawing/2014/main" id="{7C00E1DA-EC7C-40FC-95E3-11FDCD2E4291}"/>
+                <a16:creationId xmlns:a16="http://schemas.microsoft.com/office/drawing/2014/main" xmlns="" id="{7C00E1DA-EC7C-40FC-95E3-11FDCD2E4291}"/>
               </a:ext>
               <a:ext uri="{C183D7F6-B498-43B3-948B-1728B52AA6E4}">
-                <adec:decorative xmlns:adec="http://schemas.microsoft.com/office/drawing/2017/decorative" val="1"/>
+                <adec:decorative xmlns:adec="http://schemas.microsoft.com/office/drawing/2017/decorative" xmlns="" val="1"/>
               </a:ext>
             </a:extLst>
           </p:cNvPr>
@@ -5570,7 +5570,7 @@
           <p:nvPr>
             <p:extLst>
               <p:ext uri="{386F3935-93C4-4BCD-93E2-E3B085C9AB24}">
-                <p16:designElem xmlns:p16="http://schemas.microsoft.com/office/powerpoint/2015/main" val="1"/>
+                <p16:designElem xmlns:p16="http://schemas.microsoft.com/office/powerpoint/2015/main" xmlns="" val="1"/>
               </p:ext>
             </p:extLst>
           </p:nvPr>
@@ -5618,10 +5618,10 @@
           <p:cNvPr id="14" name="Grupo 13">
             <a:extLst>
               <a:ext uri="{FF2B5EF4-FFF2-40B4-BE49-F238E27FC236}">
-                <a16:creationId xmlns:a16="http://schemas.microsoft.com/office/drawing/2014/main" id="{9A421166-2996-41A7-B094-AE5316F347DD}"/>
+                <a16:creationId xmlns:a16="http://schemas.microsoft.com/office/drawing/2014/main" xmlns="" id="{9A421166-2996-41A7-B094-AE5316F347DD}"/>
               </a:ext>
               <a:ext uri="{C183D7F6-B498-43B3-948B-1728B52AA6E4}">
-                <adec:decorative xmlns:adec="http://schemas.microsoft.com/office/drawing/2017/decorative" val="1"/>
+                <adec:decorative xmlns:adec="http://schemas.microsoft.com/office/drawing/2017/decorative" xmlns="" val="1"/>
               </a:ext>
             </a:extLst>
           </p:cNvPr>
@@ -5631,7 +5631,7 @@
           <p:nvPr>
             <p:extLst>
               <p:ext uri="{386F3935-93C4-4BCD-93E2-E3B085C9AB24}">
-                <p16:designElem xmlns:p16="http://schemas.microsoft.com/office/powerpoint/2015/main" val="1"/>
+                <p16:designElem xmlns:p16="http://schemas.microsoft.com/office/powerpoint/2015/main" xmlns="" val="1"/>
               </p:ext>
             </p:extLst>
           </p:nvPr>
@@ -5649,10 +5649,10 @@
             <p:cNvPr id="15" name="Rectángulo 14">
               <a:extLst>
                 <a:ext uri="{FF2B5EF4-FFF2-40B4-BE49-F238E27FC236}">
-                  <a16:creationId xmlns:a16="http://schemas.microsoft.com/office/drawing/2014/main" id="{FDBB1B92-A3EB-43E4-8FAB-D20E8ED14CEF}"/>
+                  <a16:creationId xmlns:a16="http://schemas.microsoft.com/office/drawing/2014/main" xmlns="" id="{FDBB1B92-A3EB-43E4-8FAB-D20E8ED14CEF}"/>
                 </a:ext>
                 <a:ext uri="{C183D7F6-B498-43B3-948B-1728B52AA6E4}">
-                  <adec:decorative xmlns:adec="http://schemas.microsoft.com/office/drawing/2017/decorative" val="1"/>
+                  <adec:decorative xmlns:adec="http://schemas.microsoft.com/office/drawing/2017/decorative" xmlns="" val="1"/>
                 </a:ext>
               </a:extLst>
             </p:cNvPr>
@@ -5660,7 +5660,7 @@
             <p:nvPr>
               <p:extLst>
                 <p:ext uri="{386F3935-93C4-4BCD-93E2-E3B085C9AB24}">
-                  <p16:designElem xmlns:p16="http://schemas.microsoft.com/office/powerpoint/2015/main" val="1"/>
+                  <p16:designElem xmlns:p16="http://schemas.microsoft.com/office/powerpoint/2015/main" xmlns="" val="1"/>
                 </p:ext>
               </p:extLst>
             </p:nvPr>
@@ -5708,10 +5708,10 @@
             <p:cNvPr id="16" name="Rectángulo 15">
               <a:extLst>
                 <a:ext uri="{FF2B5EF4-FFF2-40B4-BE49-F238E27FC236}">
-                  <a16:creationId xmlns:a16="http://schemas.microsoft.com/office/drawing/2014/main" id="{3F3972F4-FE7E-48EA-AAD8-9BE5750A6672}"/>
+                  <a16:creationId xmlns:a16="http://schemas.microsoft.com/office/drawing/2014/main" xmlns="" id="{3F3972F4-FE7E-48EA-AAD8-9BE5750A6672}"/>
                 </a:ext>
                 <a:ext uri="{C183D7F6-B498-43B3-948B-1728B52AA6E4}">
-                  <adec:decorative xmlns:adec="http://schemas.microsoft.com/office/drawing/2017/decorative" val="1"/>
+                  <adec:decorative xmlns:adec="http://schemas.microsoft.com/office/drawing/2017/decorative" xmlns="" val="1"/>
                 </a:ext>
               </a:extLst>
             </p:cNvPr>
@@ -5719,7 +5719,7 @@
             <p:nvPr>
               <p:extLst>
                 <p:ext uri="{386F3935-93C4-4BCD-93E2-E3B085C9AB24}">
-                  <p16:designElem xmlns:p16="http://schemas.microsoft.com/office/powerpoint/2015/main" val="1"/>
+                  <p16:designElem xmlns:p16="http://schemas.microsoft.com/office/powerpoint/2015/main" xmlns="" val="1"/>
                 </p:ext>
               </p:extLst>
             </p:nvPr>
@@ -5767,10 +5767,10 @@
             <p:cNvPr id="17" name="Rectángulo 16">
               <a:extLst>
                 <a:ext uri="{FF2B5EF4-FFF2-40B4-BE49-F238E27FC236}">
-                  <a16:creationId xmlns:a16="http://schemas.microsoft.com/office/drawing/2014/main" id="{221614E5-870B-4D5E-A43B-8FF7E5323484}"/>
+                  <a16:creationId xmlns:a16="http://schemas.microsoft.com/office/drawing/2014/main" xmlns="" id="{221614E5-870B-4D5E-A43B-8FF7E5323484}"/>
                 </a:ext>
                 <a:ext uri="{C183D7F6-B498-43B3-948B-1728B52AA6E4}">
-                  <adec:decorative xmlns:adec="http://schemas.microsoft.com/office/drawing/2017/decorative" val="1"/>
+                  <adec:decorative xmlns:adec="http://schemas.microsoft.com/office/drawing/2017/decorative" xmlns="" val="1"/>
                 </a:ext>
               </a:extLst>
             </p:cNvPr>
@@ -5778,7 +5778,7 @@
             <p:nvPr>
               <p:extLst>
                 <p:ext uri="{386F3935-93C4-4BCD-93E2-E3B085C9AB24}">
-                  <p16:designElem xmlns:p16="http://schemas.microsoft.com/office/powerpoint/2015/main" val="1"/>
+                  <p16:designElem xmlns:p16="http://schemas.microsoft.com/office/powerpoint/2015/main" xmlns="" val="1"/>
                 </p:ext>
               </p:extLst>
             </p:nvPr>
@@ -5827,7 +5827,7 @@
           <p:cNvPr id="2" name="Título 1">
             <a:extLst>
               <a:ext uri="{FF2B5EF4-FFF2-40B4-BE49-F238E27FC236}">
-                <a16:creationId xmlns:a16="http://schemas.microsoft.com/office/drawing/2014/main" id="{0F87E73C-2B1A-4602-BFBE-CFE1E55D9B38}"/>
+                <a16:creationId xmlns:a16="http://schemas.microsoft.com/office/drawing/2014/main" xmlns="" id="{0F87E73C-2B1A-4602-BFBE-CFE1E55D9B38}"/>
               </a:ext>
             </a:extLst>
           </p:cNvPr>
@@ -5867,7 +5867,7 @@
           <p:cNvPr id="3" name="Subtítulo 2">
             <a:extLst>
               <a:ext uri="{FF2B5EF4-FFF2-40B4-BE49-F238E27FC236}">
-                <a16:creationId xmlns:a16="http://schemas.microsoft.com/office/drawing/2014/main" id="{A9CB511D-EA45-4336-847C-1252667143B5}"/>
+                <a16:creationId xmlns:a16="http://schemas.microsoft.com/office/drawing/2014/main" xmlns="" id="{A9CB511D-EA45-4336-847C-1252667143B5}"/>
               </a:ext>
             </a:extLst>
           </p:cNvPr>
@@ -5920,7 +5920,7 @@
           <p:cNvPr id="1026" name="Picture 2" descr="Hombre de estilo plano con gafas de realidad virtual haciendo dibujos  animados de análisis de datos | Vector Premium">
             <a:extLst>
               <a:ext uri="{FF2B5EF4-FFF2-40B4-BE49-F238E27FC236}">
-                <a16:creationId xmlns:a16="http://schemas.microsoft.com/office/drawing/2014/main" id="{378142A7-608D-90C7-3BB4-662ED696A4CA}"/>
+                <a16:creationId xmlns:a16="http://schemas.microsoft.com/office/drawing/2014/main" xmlns="" id="{378142A7-608D-90C7-3BB4-662ED696A4CA}"/>
               </a:ext>
             </a:extLst>
           </p:cNvPr>
@@ -5997,7 +5997,7 @@
           <p:cNvPr id="2" name="Título 1">
             <a:extLst>
               <a:ext uri="{FF2B5EF4-FFF2-40B4-BE49-F238E27FC236}">
-                <a16:creationId xmlns:a16="http://schemas.microsoft.com/office/drawing/2014/main" id="{42D89D72-4F74-9D22-4A01-D1E4CF07C7B5}"/>
+                <a16:creationId xmlns:a16="http://schemas.microsoft.com/office/drawing/2014/main" xmlns="" id="{42D89D72-4F74-9D22-4A01-D1E4CF07C7B5}"/>
               </a:ext>
             </a:extLst>
           </p:cNvPr>
@@ -6032,7 +6032,7 @@
           <p:cNvPr id="3" name="Rectángulo: esquinas redondeadas 2">
             <a:extLst>
               <a:ext uri="{FF2B5EF4-FFF2-40B4-BE49-F238E27FC236}">
-                <a16:creationId xmlns:a16="http://schemas.microsoft.com/office/drawing/2014/main" id="{323F560B-04DB-FED5-05E4-29BBA6275766}"/>
+                <a16:creationId xmlns:a16="http://schemas.microsoft.com/office/drawing/2014/main" xmlns="" id="{323F560B-04DB-FED5-05E4-29BBA6275766}"/>
               </a:ext>
             </a:extLst>
           </p:cNvPr>
@@ -6081,7 +6081,7 @@
           <p:cNvPr id="4" name="Marcador de contenido 5">
             <a:extLst>
               <a:ext uri="{FF2B5EF4-FFF2-40B4-BE49-F238E27FC236}">
-                <a16:creationId xmlns:a16="http://schemas.microsoft.com/office/drawing/2014/main" id="{8054B03E-1430-DEC7-83CD-0AA08D0DA437}"/>
+                <a16:creationId xmlns:a16="http://schemas.microsoft.com/office/drawing/2014/main" xmlns="" id="{8054B03E-1430-DEC7-83CD-0AA08D0DA437}"/>
               </a:ext>
             </a:extLst>
           </p:cNvPr>
@@ -6325,7 +6325,7 @@
           <p:cNvPr id="5" name="Diagrama de flujo: conector 4">
             <a:extLst>
               <a:ext uri="{FF2B5EF4-FFF2-40B4-BE49-F238E27FC236}">
-                <a16:creationId xmlns:a16="http://schemas.microsoft.com/office/drawing/2014/main" id="{22DB4D67-D4AB-83DC-029C-43023C3BCAE3}"/>
+                <a16:creationId xmlns:a16="http://schemas.microsoft.com/office/drawing/2014/main" xmlns="" id="{22DB4D67-D4AB-83DC-029C-43023C3BCAE3}"/>
               </a:ext>
             </a:extLst>
           </p:cNvPr>
@@ -6384,7 +6384,7 @@
           <p:cNvPr id="7" name="Marcador de contenido 5">
             <a:extLst>
               <a:ext uri="{FF2B5EF4-FFF2-40B4-BE49-F238E27FC236}">
-                <a16:creationId xmlns:a16="http://schemas.microsoft.com/office/drawing/2014/main" id="{33F41D62-8E1A-A598-C8CC-3899B9081430}"/>
+                <a16:creationId xmlns:a16="http://schemas.microsoft.com/office/drawing/2014/main" xmlns="" id="{33F41D62-8E1A-A598-C8CC-3899B9081430}"/>
               </a:ext>
             </a:extLst>
           </p:cNvPr>
@@ -6622,7 +6622,7 @@
           <p:cNvPr id="8" name="Rectángulo: esquinas redondeadas 7">
             <a:extLst>
               <a:ext uri="{FF2B5EF4-FFF2-40B4-BE49-F238E27FC236}">
-                <a16:creationId xmlns:a16="http://schemas.microsoft.com/office/drawing/2014/main" id="{4C02DAA6-DCBA-FC49-B253-BBB491ED89AE}"/>
+                <a16:creationId xmlns:a16="http://schemas.microsoft.com/office/drawing/2014/main" xmlns="" id="{4C02DAA6-DCBA-FC49-B253-BBB491ED89AE}"/>
               </a:ext>
             </a:extLst>
           </p:cNvPr>
@@ -6671,7 +6671,7 @@
           <p:cNvPr id="9" name="Marcador de contenido 5">
             <a:extLst>
               <a:ext uri="{FF2B5EF4-FFF2-40B4-BE49-F238E27FC236}">
-                <a16:creationId xmlns:a16="http://schemas.microsoft.com/office/drawing/2014/main" id="{B5D7D714-FD2B-3E04-4137-22F228514CA6}"/>
+                <a16:creationId xmlns:a16="http://schemas.microsoft.com/office/drawing/2014/main" xmlns="" id="{B5D7D714-FD2B-3E04-4137-22F228514CA6}"/>
               </a:ext>
             </a:extLst>
           </p:cNvPr>
@@ -6924,7 +6924,7 @@
           <p:cNvPr id="10" name="Diagrama de flujo: conector 9">
             <a:extLst>
               <a:ext uri="{FF2B5EF4-FFF2-40B4-BE49-F238E27FC236}">
-                <a16:creationId xmlns:a16="http://schemas.microsoft.com/office/drawing/2014/main" id="{46C0425F-2C4B-BB67-D538-97B389FD96C4}"/>
+                <a16:creationId xmlns:a16="http://schemas.microsoft.com/office/drawing/2014/main" xmlns="" id="{46C0425F-2C4B-BB67-D538-97B389FD96C4}"/>
               </a:ext>
             </a:extLst>
           </p:cNvPr>
@@ -6983,7 +6983,7 @@
           <p:cNvPr id="11" name="Marcador de contenido 5">
             <a:extLst>
               <a:ext uri="{FF2B5EF4-FFF2-40B4-BE49-F238E27FC236}">
-                <a16:creationId xmlns:a16="http://schemas.microsoft.com/office/drawing/2014/main" id="{64F1CCBC-D238-7CFA-B2DD-649082ABB022}"/>
+                <a16:creationId xmlns:a16="http://schemas.microsoft.com/office/drawing/2014/main" xmlns="" id="{64F1CCBC-D238-7CFA-B2DD-649082ABB022}"/>
               </a:ext>
             </a:extLst>
           </p:cNvPr>
@@ -7221,7 +7221,7 @@
           <p:cNvPr id="12" name="Rectángulo: esquinas redondeadas 11">
             <a:extLst>
               <a:ext uri="{FF2B5EF4-FFF2-40B4-BE49-F238E27FC236}">
-                <a16:creationId xmlns:a16="http://schemas.microsoft.com/office/drawing/2014/main" id="{C1D031D5-E12F-CAAD-681F-D1D1F9D01200}"/>
+                <a16:creationId xmlns:a16="http://schemas.microsoft.com/office/drawing/2014/main" xmlns="" id="{C1D031D5-E12F-CAAD-681F-D1D1F9D01200}"/>
               </a:ext>
             </a:extLst>
           </p:cNvPr>
@@ -7270,7 +7270,7 @@
           <p:cNvPr id="13" name="Marcador de contenido 5">
             <a:extLst>
               <a:ext uri="{FF2B5EF4-FFF2-40B4-BE49-F238E27FC236}">
-                <a16:creationId xmlns:a16="http://schemas.microsoft.com/office/drawing/2014/main" id="{513633CA-1C25-E2D3-B110-62F4E6BF6429}"/>
+                <a16:creationId xmlns:a16="http://schemas.microsoft.com/office/drawing/2014/main" xmlns="" id="{513633CA-1C25-E2D3-B110-62F4E6BF6429}"/>
               </a:ext>
             </a:extLst>
           </p:cNvPr>
@@ -7514,7 +7514,7 @@
           <p:cNvPr id="14" name="Diagrama de flujo: conector 13">
             <a:extLst>
               <a:ext uri="{FF2B5EF4-FFF2-40B4-BE49-F238E27FC236}">
-                <a16:creationId xmlns:a16="http://schemas.microsoft.com/office/drawing/2014/main" id="{6DEED7F4-8C8E-9A72-779D-9067416D3373}"/>
+                <a16:creationId xmlns:a16="http://schemas.microsoft.com/office/drawing/2014/main" xmlns="" id="{6DEED7F4-8C8E-9A72-779D-9067416D3373}"/>
               </a:ext>
             </a:extLst>
           </p:cNvPr>
@@ -7573,7 +7573,7 @@
           <p:cNvPr id="15" name="Marcador de contenido 5">
             <a:extLst>
               <a:ext uri="{FF2B5EF4-FFF2-40B4-BE49-F238E27FC236}">
-                <a16:creationId xmlns:a16="http://schemas.microsoft.com/office/drawing/2014/main" id="{902C97CD-F7EE-658E-A4E9-F1D88511AFCA}"/>
+                <a16:creationId xmlns:a16="http://schemas.microsoft.com/office/drawing/2014/main" xmlns="" id="{902C97CD-F7EE-658E-A4E9-F1D88511AFCA}"/>
               </a:ext>
             </a:extLst>
           </p:cNvPr>
@@ -7811,7 +7811,7 @@
           <p:cNvPr id="16" name="Rectángulo: esquinas redondeadas 15">
             <a:extLst>
               <a:ext uri="{FF2B5EF4-FFF2-40B4-BE49-F238E27FC236}">
-                <a16:creationId xmlns:a16="http://schemas.microsoft.com/office/drawing/2014/main" id="{6B3CCCC1-2C37-8F4F-27B6-3989F9675790}"/>
+                <a16:creationId xmlns:a16="http://schemas.microsoft.com/office/drawing/2014/main" xmlns="" id="{6B3CCCC1-2C37-8F4F-27B6-3989F9675790}"/>
               </a:ext>
             </a:extLst>
           </p:cNvPr>
@@ -7860,7 +7860,7 @@
           <p:cNvPr id="17" name="Marcador de contenido 5">
             <a:extLst>
               <a:ext uri="{FF2B5EF4-FFF2-40B4-BE49-F238E27FC236}">
-                <a16:creationId xmlns:a16="http://schemas.microsoft.com/office/drawing/2014/main" id="{52E69070-60BA-A7B6-43A1-1A97B299C10D}"/>
+                <a16:creationId xmlns:a16="http://schemas.microsoft.com/office/drawing/2014/main" xmlns="" id="{52E69070-60BA-A7B6-43A1-1A97B299C10D}"/>
               </a:ext>
             </a:extLst>
           </p:cNvPr>
@@ -8104,7 +8104,7 @@
           <p:cNvPr id="18" name="Diagrama de flujo: conector 17">
             <a:extLst>
               <a:ext uri="{FF2B5EF4-FFF2-40B4-BE49-F238E27FC236}">
-                <a16:creationId xmlns:a16="http://schemas.microsoft.com/office/drawing/2014/main" id="{0D1BDC5D-1854-8D87-DEAB-72BC52E218B6}"/>
+                <a16:creationId xmlns:a16="http://schemas.microsoft.com/office/drawing/2014/main" xmlns="" id="{0D1BDC5D-1854-8D87-DEAB-72BC52E218B6}"/>
               </a:ext>
             </a:extLst>
           </p:cNvPr>
@@ -8163,7 +8163,7 @@
           <p:cNvPr id="19" name="Marcador de contenido 5">
             <a:extLst>
               <a:ext uri="{FF2B5EF4-FFF2-40B4-BE49-F238E27FC236}">
-                <a16:creationId xmlns:a16="http://schemas.microsoft.com/office/drawing/2014/main" id="{62C43ACD-C1BD-8544-C4E3-120BD35A29B8}"/>
+                <a16:creationId xmlns:a16="http://schemas.microsoft.com/office/drawing/2014/main" xmlns="" id="{62C43ACD-C1BD-8544-C4E3-120BD35A29B8}"/>
               </a:ext>
             </a:extLst>
           </p:cNvPr>
@@ -8401,7 +8401,7 @@
           <p:cNvPr id="23" name="Rectángulo: esquinas redondeadas 22">
             <a:extLst>
               <a:ext uri="{FF2B5EF4-FFF2-40B4-BE49-F238E27FC236}">
-                <a16:creationId xmlns:a16="http://schemas.microsoft.com/office/drawing/2014/main" id="{4E34D35E-9FF3-F9FB-47DA-30E455AD0470}"/>
+                <a16:creationId xmlns:a16="http://schemas.microsoft.com/office/drawing/2014/main" xmlns="" id="{4E34D35E-9FF3-F9FB-47DA-30E455AD0470}"/>
               </a:ext>
             </a:extLst>
           </p:cNvPr>
@@ -8450,7 +8450,7 @@
           <p:cNvPr id="24" name="Marcador de contenido 5">
             <a:extLst>
               <a:ext uri="{FF2B5EF4-FFF2-40B4-BE49-F238E27FC236}">
-                <a16:creationId xmlns:a16="http://schemas.microsoft.com/office/drawing/2014/main" id="{EB68F8B7-C529-E260-AAFF-9013DDC3F566}"/>
+                <a16:creationId xmlns:a16="http://schemas.microsoft.com/office/drawing/2014/main" xmlns="" id="{EB68F8B7-C529-E260-AAFF-9013DDC3F566}"/>
               </a:ext>
             </a:extLst>
           </p:cNvPr>
@@ -8694,7 +8694,7 @@
           <p:cNvPr id="25" name="Diagrama de flujo: conector 24">
             <a:extLst>
               <a:ext uri="{FF2B5EF4-FFF2-40B4-BE49-F238E27FC236}">
-                <a16:creationId xmlns:a16="http://schemas.microsoft.com/office/drawing/2014/main" id="{B23CAD62-A55A-AFCA-F451-DE42EE53B081}"/>
+                <a16:creationId xmlns:a16="http://schemas.microsoft.com/office/drawing/2014/main" xmlns="" id="{B23CAD62-A55A-AFCA-F451-DE42EE53B081}"/>
               </a:ext>
             </a:extLst>
           </p:cNvPr>
@@ -8753,7 +8753,7 @@
           <p:cNvPr id="26" name="Marcador de contenido 5">
             <a:extLst>
               <a:ext uri="{FF2B5EF4-FFF2-40B4-BE49-F238E27FC236}">
-                <a16:creationId xmlns:a16="http://schemas.microsoft.com/office/drawing/2014/main" id="{E7353DA2-1D33-06C3-FECB-BA0A9E9AB8E6}"/>
+                <a16:creationId xmlns:a16="http://schemas.microsoft.com/office/drawing/2014/main" xmlns="" id="{E7353DA2-1D33-06C3-FECB-BA0A9E9AB8E6}"/>
               </a:ext>
             </a:extLst>
           </p:cNvPr>
@@ -8991,7 +8991,7 @@
           <p:cNvPr id="27" name="Rectángulo: esquinas redondeadas 26">
             <a:extLst>
               <a:ext uri="{FF2B5EF4-FFF2-40B4-BE49-F238E27FC236}">
-                <a16:creationId xmlns:a16="http://schemas.microsoft.com/office/drawing/2014/main" id="{0F6D126D-B5B3-A077-BBFA-B4B2F4A6F7EC}"/>
+                <a16:creationId xmlns:a16="http://schemas.microsoft.com/office/drawing/2014/main" xmlns="" id="{0F6D126D-B5B3-A077-BBFA-B4B2F4A6F7EC}"/>
               </a:ext>
             </a:extLst>
           </p:cNvPr>
@@ -9040,7 +9040,7 @@
           <p:cNvPr id="28" name="Marcador de contenido 5">
             <a:extLst>
               <a:ext uri="{FF2B5EF4-FFF2-40B4-BE49-F238E27FC236}">
-                <a16:creationId xmlns:a16="http://schemas.microsoft.com/office/drawing/2014/main" id="{287ABC08-BCAD-03AE-8541-FC7EE10A70AF}"/>
+                <a16:creationId xmlns:a16="http://schemas.microsoft.com/office/drawing/2014/main" xmlns="" id="{287ABC08-BCAD-03AE-8541-FC7EE10A70AF}"/>
               </a:ext>
             </a:extLst>
           </p:cNvPr>
@@ -9284,7 +9284,7 @@
           <p:cNvPr id="29" name="Diagrama de flujo: conector 28">
             <a:extLst>
               <a:ext uri="{FF2B5EF4-FFF2-40B4-BE49-F238E27FC236}">
-                <a16:creationId xmlns:a16="http://schemas.microsoft.com/office/drawing/2014/main" id="{A28C6BC5-6627-13B7-48F4-F2CB4309C28E}"/>
+                <a16:creationId xmlns:a16="http://schemas.microsoft.com/office/drawing/2014/main" xmlns="" id="{A28C6BC5-6627-13B7-48F4-F2CB4309C28E}"/>
               </a:ext>
             </a:extLst>
           </p:cNvPr>
@@ -9343,7 +9343,7 @@
           <p:cNvPr id="30" name="Marcador de contenido 5">
             <a:extLst>
               <a:ext uri="{FF2B5EF4-FFF2-40B4-BE49-F238E27FC236}">
-                <a16:creationId xmlns:a16="http://schemas.microsoft.com/office/drawing/2014/main" id="{2B94EA60-6236-D661-586F-C87ABC442DF8}"/>
+                <a16:creationId xmlns:a16="http://schemas.microsoft.com/office/drawing/2014/main" xmlns="" id="{2B94EA60-6236-D661-586F-C87ABC442DF8}"/>
               </a:ext>
             </a:extLst>
           </p:cNvPr>
@@ -9681,7 +9681,7 @@
           <p:cNvPr id="5" name="Picture 2" descr="joven con gafas vr con panel virtual táctil holográfico en el fondo de  trabajo digital. ilustración vectorial de dibujos animados de estilo plano  5611315 Vector en Vecteezy">
             <a:extLst>
               <a:ext uri="{FF2B5EF4-FFF2-40B4-BE49-F238E27FC236}">
-                <a16:creationId xmlns:a16="http://schemas.microsoft.com/office/drawing/2014/main" id="{585826FF-5F1D-116A-7EDB-ECF2F6EA4329}"/>
+                <a16:creationId xmlns:a16="http://schemas.microsoft.com/office/drawing/2014/main" xmlns="" id="{585826FF-5F1D-116A-7EDB-ECF2F6EA4329}"/>
               </a:ext>
             </a:extLst>
           </p:cNvPr>
@@ -9751,7 +9751,7 @@
           <p:cNvPr id="2" name="Título 1">
             <a:extLst>
               <a:ext uri="{FF2B5EF4-FFF2-40B4-BE49-F238E27FC236}">
-                <a16:creationId xmlns:a16="http://schemas.microsoft.com/office/drawing/2014/main" id="{921633EB-7DCB-4DDC-80AF-C885A3EE1245}"/>
+                <a16:creationId xmlns:a16="http://schemas.microsoft.com/office/drawing/2014/main" xmlns="" id="{921633EB-7DCB-4DDC-80AF-C885A3EE1245}"/>
               </a:ext>
             </a:extLst>
           </p:cNvPr>
@@ -9787,7 +9787,7 @@
           <p:cNvPr id="2050" name="Picture 2">
             <a:extLst>
               <a:ext uri="{FF2B5EF4-FFF2-40B4-BE49-F238E27FC236}">
-                <a16:creationId xmlns:a16="http://schemas.microsoft.com/office/drawing/2014/main" id="{CBB3C702-702A-BE87-FE26-CC78B21E26BB}"/>
+                <a16:creationId xmlns:a16="http://schemas.microsoft.com/office/drawing/2014/main" xmlns="" id="{CBB3C702-702A-BE87-FE26-CC78B21E26BB}"/>
               </a:ext>
             </a:extLst>
           </p:cNvPr>
@@ -9834,7 +9834,7 @@
           <p:cNvPr id="2054" name="Picture 6">
             <a:extLst>
               <a:ext uri="{FF2B5EF4-FFF2-40B4-BE49-F238E27FC236}">
-                <a16:creationId xmlns:a16="http://schemas.microsoft.com/office/drawing/2014/main" id="{850466B1-9229-DA87-8B21-83105A81835E}"/>
+                <a16:creationId xmlns:a16="http://schemas.microsoft.com/office/drawing/2014/main" xmlns="" id="{850466B1-9229-DA87-8B21-83105A81835E}"/>
               </a:ext>
             </a:extLst>
           </p:cNvPr>
@@ -9881,7 +9881,7 @@
           <p:cNvPr id="2056" name="Picture 8" descr="JavaScript Logo, symbol, meaning, history, PNG, brand">
             <a:extLst>
               <a:ext uri="{FF2B5EF4-FFF2-40B4-BE49-F238E27FC236}">
-                <a16:creationId xmlns:a16="http://schemas.microsoft.com/office/drawing/2014/main" id="{0AEDAC79-0779-1470-3487-6AB787026770}"/>
+                <a16:creationId xmlns:a16="http://schemas.microsoft.com/office/drawing/2014/main" xmlns="" id="{0AEDAC79-0779-1470-3487-6AB787026770}"/>
               </a:ext>
             </a:extLst>
           </p:cNvPr>
@@ -9928,7 +9928,7 @@
           <p:cNvPr id="2060" name="Picture 12" descr="Three.js SVG Logo - Questions - three.js forum">
             <a:extLst>
               <a:ext uri="{FF2B5EF4-FFF2-40B4-BE49-F238E27FC236}">
-                <a16:creationId xmlns:a16="http://schemas.microsoft.com/office/drawing/2014/main" id="{8C88ED66-83D8-CD4C-48FA-D3456DC779E9}"/>
+                <a16:creationId xmlns:a16="http://schemas.microsoft.com/office/drawing/2014/main" xmlns="" id="{8C88ED66-83D8-CD4C-48FA-D3456DC779E9}"/>
               </a:ext>
             </a:extLst>
           </p:cNvPr>
@@ -9975,7 +9975,7 @@
           <p:cNvPr id="2062" name="Picture 14" descr="W3C llama a hacer uso de la API WebXR para dispositivos – W3C Hispano">
             <a:extLst>
               <a:ext uri="{FF2B5EF4-FFF2-40B4-BE49-F238E27FC236}">
-                <a16:creationId xmlns:a16="http://schemas.microsoft.com/office/drawing/2014/main" id="{3E095A71-DB8A-48CB-C3CE-1E12E5164AEB}"/>
+                <a16:creationId xmlns:a16="http://schemas.microsoft.com/office/drawing/2014/main" xmlns="" id="{3E095A71-DB8A-48CB-C3CE-1E12E5164AEB}"/>
               </a:ext>
             </a:extLst>
           </p:cNvPr>
@@ -10022,7 +10022,7 @@
           <p:cNvPr id="2064" name="Picture 16" descr="Webgl logo - Iconos Social Media y Logos">
             <a:extLst>
               <a:ext uri="{FF2B5EF4-FFF2-40B4-BE49-F238E27FC236}">
-                <a16:creationId xmlns:a16="http://schemas.microsoft.com/office/drawing/2014/main" id="{25ABF0AE-D2FB-B1FC-DA1B-7EE2FDDF6468}"/>
+                <a16:creationId xmlns:a16="http://schemas.microsoft.com/office/drawing/2014/main" xmlns="" id="{25ABF0AE-D2FB-B1FC-DA1B-7EE2FDDF6468}"/>
               </a:ext>
             </a:extLst>
           </p:cNvPr>
@@ -10069,7 +10069,7 @@
           <p:cNvPr id="2066" name="Picture 18">
             <a:extLst>
               <a:ext uri="{FF2B5EF4-FFF2-40B4-BE49-F238E27FC236}">
-                <a16:creationId xmlns:a16="http://schemas.microsoft.com/office/drawing/2014/main" id="{751243E1-CA56-D8C7-116A-DD3FD96201D3}"/>
+                <a16:creationId xmlns:a16="http://schemas.microsoft.com/office/drawing/2014/main" xmlns="" id="{751243E1-CA56-D8C7-116A-DD3FD96201D3}"/>
               </a:ext>
             </a:extLst>
           </p:cNvPr>
@@ -10116,7 +10116,7 @@
           <p:cNvPr id="2068" name="Picture 20" descr="GitHub Logo, symbol, meaning, history, PNG, brand">
             <a:extLst>
               <a:ext uri="{FF2B5EF4-FFF2-40B4-BE49-F238E27FC236}">
-                <a16:creationId xmlns:a16="http://schemas.microsoft.com/office/drawing/2014/main" id="{CA2B6558-C937-7907-FCBD-3AF06D8DC096}"/>
+                <a16:creationId xmlns:a16="http://schemas.microsoft.com/office/drawing/2014/main" xmlns="" id="{CA2B6558-C937-7907-FCBD-3AF06D8DC096}"/>
               </a:ext>
             </a:extLst>
           </p:cNvPr>
@@ -10163,7 +10163,7 @@
           <p:cNvPr id="2070" name="Picture 22" descr="Meta: Contact Details, Revenue, Funding, Employees and Company Profile">
             <a:extLst>
               <a:ext uri="{FF2B5EF4-FFF2-40B4-BE49-F238E27FC236}">
-                <a16:creationId xmlns:a16="http://schemas.microsoft.com/office/drawing/2014/main" id="{A4C480C9-DC31-D1C3-8994-74A97E8A70AE}"/>
+                <a16:creationId xmlns:a16="http://schemas.microsoft.com/office/drawing/2014/main" xmlns="" id="{A4C480C9-DC31-D1C3-8994-74A97E8A70AE}"/>
               </a:ext>
             </a:extLst>
           </p:cNvPr>
@@ -10210,7 +10210,7 @@
           <p:cNvPr id="2076" name="Picture 28">
             <a:extLst>
               <a:ext uri="{FF2B5EF4-FFF2-40B4-BE49-F238E27FC236}">
-                <a16:creationId xmlns:a16="http://schemas.microsoft.com/office/drawing/2014/main" id="{242C7161-15D1-6C48-A362-093D578E455A}"/>
+                <a16:creationId xmlns:a16="http://schemas.microsoft.com/office/drawing/2014/main" xmlns="" id="{242C7161-15D1-6C48-A362-093D578E455A}"/>
               </a:ext>
             </a:extLst>
           </p:cNvPr>
@@ -10287,7 +10287,7 @@
           <p:cNvPr id="2" name="Título 1">
             <a:extLst>
               <a:ext uri="{FF2B5EF4-FFF2-40B4-BE49-F238E27FC236}">
-                <a16:creationId xmlns:a16="http://schemas.microsoft.com/office/drawing/2014/main" id="{6EE0696A-EC59-AEEC-926E-52105E388E70}"/>
+                <a16:creationId xmlns:a16="http://schemas.microsoft.com/office/drawing/2014/main" xmlns="" id="{6EE0696A-EC59-AEEC-926E-52105E388E70}"/>
               </a:ext>
             </a:extLst>
           </p:cNvPr>
@@ -10322,7 +10322,7 @@
           <p:cNvPr id="5" name="Marcador de contenido 4" descr="Diagrama&#10;&#10;El contenido generado por IA puede ser incorrecto.">
             <a:extLst>
               <a:ext uri="{FF2B5EF4-FFF2-40B4-BE49-F238E27FC236}">
-                <a16:creationId xmlns:a16="http://schemas.microsoft.com/office/drawing/2014/main" id="{721A3A4B-E5FF-B1E1-B571-5150480FE290}"/>
+                <a16:creationId xmlns:a16="http://schemas.microsoft.com/office/drawing/2014/main" xmlns="" id="{721A3A4B-E5FF-B1E1-B571-5150480FE290}"/>
               </a:ext>
             </a:extLst>
           </p:cNvPr>
@@ -10352,7 +10352,7 @@
           <p:cNvPr id="10" name="Content Placeholder 2">
             <a:extLst>
               <a:ext uri="{FF2B5EF4-FFF2-40B4-BE49-F238E27FC236}">
-                <a16:creationId xmlns:a16="http://schemas.microsoft.com/office/drawing/2014/main" id="{F1254407-A1D7-ACDB-29EA-008B1B0421D3}"/>
+                <a16:creationId xmlns:a16="http://schemas.microsoft.com/office/drawing/2014/main" xmlns="" id="{F1254407-A1D7-ACDB-29EA-008B1B0421D3}"/>
               </a:ext>
             </a:extLst>
           </p:cNvPr>
@@ -10436,7 +10436,7 @@
           <p:cNvPr id="2" name="Título 1">
             <a:extLst>
               <a:ext uri="{FF2B5EF4-FFF2-40B4-BE49-F238E27FC236}">
-                <a16:creationId xmlns:a16="http://schemas.microsoft.com/office/drawing/2014/main" id="{6CE80B81-BF7A-61AD-1FEA-D23301C94B85}"/>
+                <a16:creationId xmlns:a16="http://schemas.microsoft.com/office/drawing/2014/main" xmlns="" id="{6CE80B81-BF7A-61AD-1FEA-D23301C94B85}"/>
               </a:ext>
             </a:extLst>
           </p:cNvPr>
@@ -10464,7 +10464,7 @@
           <p:cNvPr id="7" name="Marcador de contenido 6" descr="Imagen de la pantalla de un celular&#10;&#10;El contenido generado por IA puede ser incorrecto.">
             <a:extLst>
               <a:ext uri="{FF2B5EF4-FFF2-40B4-BE49-F238E27FC236}">
-                <a16:creationId xmlns:a16="http://schemas.microsoft.com/office/drawing/2014/main" id="{363A8432-8183-77A3-5F54-0182D6E74A66}"/>
+                <a16:creationId xmlns:a16="http://schemas.microsoft.com/office/drawing/2014/main" xmlns="" id="{363A8432-8183-77A3-5F54-0182D6E74A66}"/>
               </a:ext>
             </a:extLst>
           </p:cNvPr>
@@ -10493,7 +10493,7 @@
           <p:cNvPr id="5" name="Marcador de contenido 4" descr="Diagrama&#10;&#10;El contenido generado por IA puede ser incorrecto.">
             <a:extLst>
               <a:ext uri="{FF2B5EF4-FFF2-40B4-BE49-F238E27FC236}">
-                <a16:creationId xmlns:a16="http://schemas.microsoft.com/office/drawing/2014/main" id="{B74ADE4E-93BD-BBA7-BA74-0FC00156711B}"/>
+                <a16:creationId xmlns:a16="http://schemas.microsoft.com/office/drawing/2014/main" xmlns="" id="{B74ADE4E-93BD-BBA7-BA74-0FC00156711B}"/>
               </a:ext>
             </a:extLst>
           </p:cNvPr>
@@ -10541,7 +10541,7 @@
         <p:cNvPr id="1" name="">
           <a:extLst>
             <a:ext uri="{FF2B5EF4-FFF2-40B4-BE49-F238E27FC236}">
-              <a16:creationId xmlns:a16="http://schemas.microsoft.com/office/drawing/2014/main" id="{6AD13276-D651-31DB-39AC-D9CE767348AE}"/>
+              <a16:creationId xmlns:a16="http://schemas.microsoft.com/office/drawing/2014/main" xmlns="" id="{6AD13276-D651-31DB-39AC-D9CE767348AE}"/>
             </a:ext>
           </a:extLst>
         </p:cNvPr>
@@ -10561,7 +10561,7 @@
           <p:cNvPr id="2" name="Título 1">
             <a:extLst>
               <a:ext uri="{FF2B5EF4-FFF2-40B4-BE49-F238E27FC236}">
-                <a16:creationId xmlns:a16="http://schemas.microsoft.com/office/drawing/2014/main" id="{E4E63F76-7E1A-BB2C-1632-9EF50B6C979C}"/>
+                <a16:creationId xmlns:a16="http://schemas.microsoft.com/office/drawing/2014/main" xmlns="" id="{E4E63F76-7E1A-BB2C-1632-9EF50B6C979C}"/>
               </a:ext>
             </a:extLst>
           </p:cNvPr>
@@ -10589,7 +10589,7 @@
           <p:cNvPr id="10" name="Marcador de contenido 9" descr="Flecha&#10;&#10;El contenido generado por IA puede ser incorrecto.">
             <a:extLst>
               <a:ext uri="{FF2B5EF4-FFF2-40B4-BE49-F238E27FC236}">
-                <a16:creationId xmlns:a16="http://schemas.microsoft.com/office/drawing/2014/main" id="{2F188675-DD19-2E42-3D3C-49654877B9BE}"/>
+                <a16:creationId xmlns:a16="http://schemas.microsoft.com/office/drawing/2014/main" xmlns="" id="{2F188675-DD19-2E42-3D3C-49654877B9BE}"/>
               </a:ext>
             </a:extLst>
           </p:cNvPr>
@@ -10618,7 +10618,7 @@
           <p:cNvPr id="12" name="Marcador de contenido 11" descr="Imagen que contiene Gráfico&#10;&#10;El contenido generado por IA puede ser incorrecto.">
             <a:extLst>
               <a:ext uri="{FF2B5EF4-FFF2-40B4-BE49-F238E27FC236}">
-                <a16:creationId xmlns:a16="http://schemas.microsoft.com/office/drawing/2014/main" id="{B906A027-E11C-3167-21A3-147F33772B51}"/>
+                <a16:creationId xmlns:a16="http://schemas.microsoft.com/office/drawing/2014/main" xmlns="" id="{B906A027-E11C-3167-21A3-147F33772B51}"/>
               </a:ext>
             </a:extLst>
           </p:cNvPr>
@@ -10647,7 +10647,7 @@
           <p:cNvPr id="15" name="Imagen 14" descr="Imagen que contiene tabla, teléfono&#10;&#10;El contenido generado por IA puede ser incorrecto.">
             <a:extLst>
               <a:ext uri="{FF2B5EF4-FFF2-40B4-BE49-F238E27FC236}">
-                <a16:creationId xmlns:a16="http://schemas.microsoft.com/office/drawing/2014/main" id="{E8A0FCCF-ED4F-434B-41DC-4E557A95CB90}"/>
+                <a16:creationId xmlns:a16="http://schemas.microsoft.com/office/drawing/2014/main" xmlns="" id="{E8A0FCCF-ED4F-434B-41DC-4E557A95CB90}"/>
               </a:ext>
             </a:extLst>
           </p:cNvPr>
@@ -10677,7 +10677,7 @@
           <p:cNvPr id="17" name="Imagen 16" descr="Imagen que contiene computadora&#10;&#10;El contenido generado por IA puede ser incorrecto.">
             <a:extLst>
               <a:ext uri="{FF2B5EF4-FFF2-40B4-BE49-F238E27FC236}">
-                <a16:creationId xmlns:a16="http://schemas.microsoft.com/office/drawing/2014/main" id="{283209BE-81D2-5CF8-0A7C-39689412FEAC}"/>
+                <a16:creationId xmlns:a16="http://schemas.microsoft.com/office/drawing/2014/main" xmlns="" id="{283209BE-81D2-5CF8-0A7C-39689412FEAC}"/>
               </a:ext>
             </a:extLst>
           </p:cNvPr>
@@ -10737,7 +10737,7 @@
           <p:cNvPr id="2" name="Título 1">
             <a:extLst>
               <a:ext uri="{FF2B5EF4-FFF2-40B4-BE49-F238E27FC236}">
-                <a16:creationId xmlns:a16="http://schemas.microsoft.com/office/drawing/2014/main" id="{19E835AF-BF43-22A2-B6ED-4C2D80FF8DCD}"/>
+                <a16:creationId xmlns:a16="http://schemas.microsoft.com/office/drawing/2014/main" xmlns="" id="{19E835AF-BF43-22A2-B6ED-4C2D80FF8DCD}"/>
               </a:ext>
             </a:extLst>
           </p:cNvPr>
@@ -10765,7 +10765,7 @@
           <p:cNvPr id="6" name="Marcador de contenido 5">
             <a:extLst>
               <a:ext uri="{FF2B5EF4-FFF2-40B4-BE49-F238E27FC236}">
-                <a16:creationId xmlns:a16="http://schemas.microsoft.com/office/drawing/2014/main" id="{6D475090-73A0-F59A-CCE1-CCD9E831D5D0}"/>
+                <a16:creationId xmlns:a16="http://schemas.microsoft.com/office/drawing/2014/main" xmlns="" id="{6D475090-73A0-F59A-CCE1-CCD9E831D5D0}"/>
               </a:ext>
             </a:extLst>
           </p:cNvPr>
@@ -10776,14 +10776,14 @@
             <p:ph idx="1"/>
             <p:extLst>
               <p:ext uri="{D42A27DB-BD31-4B8C-83A1-F6EECF244321}">
-                <p14:modId xmlns:p14="http://schemas.microsoft.com/office/powerpoint/2010/main" val="3261886965"/>
+                <p14:modId xmlns:p14="http://schemas.microsoft.com/office/powerpoint/2010/main" val="2067452281"/>
               </p:ext>
             </p:extLst>
           </p:nvPr>
         </p:nvGraphicFramePr>
         <p:xfrm>
           <a:off x="581192" y="2469983"/>
-          <a:ext cx="11018000" cy="2966720"/>
+          <a:ext cx="11018000" cy="3235960"/>
         </p:xfrm>
         <a:graphic>
           <a:graphicData uri="http://schemas.openxmlformats.org/drawingml/2006/table">
@@ -10792,24 +10792,25 @@
                 <a:tableStyleId>{5C22544A-7EE6-4342-B048-85BDC9FD1C3A}</a:tableStyleId>
               </a:tblPr>
               <a:tblGrid>
-                <a:gridCol w="3664700">
+                <a:gridCol w="2012718">
                   <a:extLst>
                     <a:ext uri="{9D8B030D-6E8A-4147-A177-3AD203B41FA5}">
-                      <a16:colId xmlns:a16="http://schemas.microsoft.com/office/drawing/2014/main" val="1237714882"/>
+                      <a16:colId xmlns:a16="http://schemas.microsoft.com/office/drawing/2014/main" xmlns="" val="1237714882"/>
                     </a:ext>
                   </a:extLst>
                 </a:gridCol>
-                <a:gridCol w="3676650">
+                <a:gridCol w="3487314"/>
+                <a:gridCol w="2758984">
                   <a:extLst>
                     <a:ext uri="{9D8B030D-6E8A-4147-A177-3AD203B41FA5}">
-                      <a16:colId xmlns:a16="http://schemas.microsoft.com/office/drawing/2014/main" val="2152919591"/>
+                      <a16:colId xmlns:a16="http://schemas.microsoft.com/office/drawing/2014/main" xmlns="" val="2152919591"/>
                     </a:ext>
                   </a:extLst>
                 </a:gridCol>
-                <a:gridCol w="3676650">
+                <a:gridCol w="2758984">
                   <a:extLst>
                     <a:ext uri="{9D8B030D-6E8A-4147-A177-3AD203B41FA5}">
-                      <a16:colId xmlns:a16="http://schemas.microsoft.com/office/drawing/2014/main" val="3690353977"/>
+                      <a16:colId xmlns:a16="http://schemas.microsoft.com/office/drawing/2014/main" xmlns="" val="3690353977"/>
                     </a:ext>
                   </a:extLst>
                 </a:gridCol>
@@ -10824,6 +10825,21 @@
                       <a:r>
                         <a:rPr lang="es-ES" dirty="0" err="1"/>
                         <a:t>Sprints</a:t>
+                      </a:r>
+                      <a:endParaRPr lang="es-ES" dirty="0"/>
+                    </a:p>
+                  </a:txBody>
+                  <a:tcPr/>
+                </a:tc>
+                <a:tc>
+                  <a:txBody>
+                    <a:bodyPr/>
+                    <a:lstStyle/>
+                    <a:p>
+                      <a:pPr algn="ctr"/>
+                      <a:r>
+                        <a:rPr lang="es-ES" dirty="0" smtClean="0"/>
+                        <a:t>Titulo</a:t>
                       </a:r>
                       <a:endParaRPr lang="es-ES" dirty="0"/>
                     </a:p>
@@ -10860,7 +10876,7 @@
                 </a:tc>
                 <a:extLst>
                   <a:ext uri="{0D108BD9-81ED-4DB2-BD59-A6C34878D82A}">
-                    <a16:rowId xmlns:a16="http://schemas.microsoft.com/office/drawing/2014/main" val="1231240131"/>
+                    <a16:rowId xmlns:a16="http://schemas.microsoft.com/office/drawing/2014/main" xmlns="" val="1231240131"/>
                   </a:ext>
                 </a:extLst>
               </a:tr>
@@ -10874,6 +10890,24 @@
                         <a:rPr lang="es-ES" dirty="0"/>
                         <a:t>Sprint 0</a:t>
                       </a:r>
+                    </a:p>
+                  </a:txBody>
+                  <a:tcPr/>
+                </a:tc>
+                <a:tc>
+                  <a:txBody>
+                    <a:bodyPr/>
+                    <a:lstStyle/>
+                    <a:p>
+                      <a:r>
+                        <a:rPr lang="es-ES" dirty="0" smtClean="0"/>
+                        <a:t>Puesta en</a:t>
+                      </a:r>
+                      <a:r>
+                        <a:rPr lang="es-ES" baseline="0" dirty="0" smtClean="0"/>
+                        <a:t> marcha</a:t>
+                      </a:r>
+                      <a:endParaRPr lang="es-ES" dirty="0"/>
                     </a:p>
                   </a:txBody>
                   <a:tcPr/>
@@ -10906,7 +10940,7 @@
                 </a:tc>
                 <a:extLst>
                   <a:ext uri="{0D108BD9-81ED-4DB2-BD59-A6C34878D82A}">
-                    <a16:rowId xmlns:a16="http://schemas.microsoft.com/office/drawing/2014/main" val="1652713779"/>
+                    <a16:rowId xmlns:a16="http://schemas.microsoft.com/office/drawing/2014/main" xmlns="" val="1652713779"/>
                   </a:ext>
                 </a:extLst>
               </a:tr>
@@ -10920,6 +10954,20 @@
                         <a:rPr lang="es-ES" dirty="0"/>
                         <a:t>Sprint 1</a:t>
                       </a:r>
+                    </a:p>
+                  </a:txBody>
+                  <a:tcPr/>
+                </a:tc>
+                <a:tc>
+                  <a:txBody>
+                    <a:bodyPr/>
+                    <a:lstStyle/>
+                    <a:p>
+                      <a:r>
+                        <a:rPr lang="es-ES" dirty="0" smtClean="0"/>
+                        <a:t>Primeras manos</a:t>
+                      </a:r>
+                      <a:endParaRPr lang="es-ES" dirty="0"/>
                     </a:p>
                   </a:txBody>
                   <a:tcPr/>
@@ -10952,7 +11000,7 @@
                 </a:tc>
                 <a:extLst>
                   <a:ext uri="{0D108BD9-81ED-4DB2-BD59-A6C34878D82A}">
-                    <a16:rowId xmlns:a16="http://schemas.microsoft.com/office/drawing/2014/main" val="3925492534"/>
+                    <a16:rowId xmlns:a16="http://schemas.microsoft.com/office/drawing/2014/main" xmlns="" val="3925492534"/>
                   </a:ext>
                 </a:extLst>
               </a:tr>
@@ -10966,6 +11014,24 @@
                         <a:rPr lang="es-ES" dirty="0"/>
                         <a:t>Sprint 2</a:t>
                       </a:r>
+                    </a:p>
+                  </a:txBody>
+                  <a:tcPr/>
+                </a:tc>
+                <a:tc>
+                  <a:txBody>
+                    <a:bodyPr/>
+                    <a:lstStyle/>
+                    <a:p>
+                      <a:r>
+                        <a:rPr lang="es-ES" dirty="0" smtClean="0"/>
+                        <a:t>Introducción</a:t>
+                      </a:r>
+                      <a:r>
+                        <a:rPr lang="es-ES" baseline="0" dirty="0" smtClean="0"/>
+                        <a:t> de eventos y gestos</a:t>
+                      </a:r>
+                      <a:endParaRPr lang="es-ES" dirty="0"/>
                     </a:p>
                   </a:txBody>
                   <a:tcPr/>
@@ -10998,7 +11064,7 @@
                 </a:tc>
                 <a:extLst>
                   <a:ext uri="{0D108BD9-81ED-4DB2-BD59-A6C34878D82A}">
-                    <a16:rowId xmlns:a16="http://schemas.microsoft.com/office/drawing/2014/main" val="2242572653"/>
+                    <a16:rowId xmlns:a16="http://schemas.microsoft.com/office/drawing/2014/main" xmlns="" val="2242572653"/>
                   </a:ext>
                 </a:extLst>
               </a:tr>
@@ -11038,6 +11104,37 @@
                     <a:bodyPr/>
                     <a:lstStyle/>
                     <a:p>
+                      <a:pPr marL="0" marR="0" lvl="0" indent="0" algn="l" defTabSz="457200" rtl="0" eaLnBrk="1" fontAlgn="auto" latinLnBrk="0" hangingPunct="1">
+                        <a:lnSpc>
+                          <a:spcPct val="100000"/>
+                        </a:lnSpc>
+                        <a:spcBef>
+                          <a:spcPts val="0"/>
+                        </a:spcBef>
+                        <a:spcAft>
+                          <a:spcPts val="0"/>
+                        </a:spcAft>
+                        <a:buClrTx/>
+                        <a:buSzTx/>
+                        <a:buFontTx/>
+                        <a:buNone/>
+                        <a:tabLst/>
+                        <a:defRPr/>
+                      </a:pPr>
+                      <a:r>
+                        <a:rPr lang="es-ES" dirty="0" smtClean="0"/>
+                        <a:t>Nuevos gestos a la escena</a:t>
+                      </a:r>
+                      <a:endParaRPr lang="es-ES" dirty="0"/>
+                    </a:p>
+                  </a:txBody>
+                  <a:tcPr/>
+                </a:tc>
+                <a:tc>
+                  <a:txBody>
+                    <a:bodyPr/>
+                    <a:lstStyle/>
+                    <a:p>
                       <a:r>
                         <a:rPr lang="es-ES" dirty="0"/>
                         <a:t>2 semanas</a:t>
@@ -11061,7 +11158,7 @@
                 </a:tc>
                 <a:extLst>
                   <a:ext uri="{0D108BD9-81ED-4DB2-BD59-A6C34878D82A}">
-                    <a16:rowId xmlns:a16="http://schemas.microsoft.com/office/drawing/2014/main" val="1998520040"/>
+                    <a16:rowId xmlns:a16="http://schemas.microsoft.com/office/drawing/2014/main" xmlns="" val="1998520040"/>
                   </a:ext>
                 </a:extLst>
               </a:tr>
@@ -11101,6 +11198,37 @@
                     <a:bodyPr/>
                     <a:lstStyle/>
                     <a:p>
+                      <a:pPr marL="0" marR="0" lvl="0" indent="0" algn="l" defTabSz="457200" rtl="0" eaLnBrk="1" fontAlgn="auto" latinLnBrk="0" hangingPunct="1">
+                        <a:lnSpc>
+                          <a:spcPct val="100000"/>
+                        </a:lnSpc>
+                        <a:spcBef>
+                          <a:spcPts val="0"/>
+                        </a:spcBef>
+                        <a:spcAft>
+                          <a:spcPts val="0"/>
+                        </a:spcAft>
+                        <a:buClrTx/>
+                        <a:buSzTx/>
+                        <a:buFontTx/>
+                        <a:buNone/>
+                        <a:tabLst/>
+                        <a:defRPr/>
+                      </a:pPr>
+                      <a:r>
+                        <a:rPr lang="es-ES" dirty="0" smtClean="0"/>
+                        <a:t>Detección de colisiones</a:t>
+                      </a:r>
+                      <a:endParaRPr lang="es-ES" dirty="0"/>
+                    </a:p>
+                  </a:txBody>
+                  <a:tcPr/>
+                </a:tc>
+                <a:tc>
+                  <a:txBody>
+                    <a:bodyPr/>
+                    <a:lstStyle/>
+                    <a:p>
                       <a:r>
                         <a:rPr lang="es-ES" dirty="0"/>
                         <a:t>1 semana</a:t>
@@ -11124,7 +11252,7 @@
                 </a:tc>
                 <a:extLst>
                   <a:ext uri="{0D108BD9-81ED-4DB2-BD59-A6C34878D82A}">
-                    <a16:rowId xmlns:a16="http://schemas.microsoft.com/office/drawing/2014/main" val="4195270764"/>
+                    <a16:rowId xmlns:a16="http://schemas.microsoft.com/office/drawing/2014/main" xmlns="" val="4195270764"/>
                   </a:ext>
                 </a:extLst>
               </a:tr>
@@ -11164,6 +11292,41 @@
                     <a:bodyPr/>
                     <a:lstStyle/>
                     <a:p>
+                      <a:pPr marL="0" marR="0" lvl="0" indent="0" algn="l" defTabSz="457200" rtl="0" eaLnBrk="1" fontAlgn="auto" latinLnBrk="0" hangingPunct="1">
+                        <a:lnSpc>
+                          <a:spcPct val="100000"/>
+                        </a:lnSpc>
+                        <a:spcBef>
+                          <a:spcPts val="0"/>
+                        </a:spcBef>
+                        <a:spcAft>
+                          <a:spcPts val="0"/>
+                        </a:spcAft>
+                        <a:buClrTx/>
+                        <a:buSzTx/>
+                        <a:buFontTx/>
+                        <a:buNone/>
+                        <a:tabLst/>
+                        <a:defRPr/>
+                      </a:pPr>
+                      <a:r>
+                        <a:rPr lang="es-ES" dirty="0" smtClean="0"/>
+                        <a:t>Incorporación de la función</a:t>
+                      </a:r>
+                      <a:r>
+                        <a:rPr lang="es-ES" baseline="0" dirty="0" smtClean="0"/>
+                        <a:t> Grabable</a:t>
+                      </a:r>
+                      <a:endParaRPr lang="es-ES" dirty="0"/>
+                    </a:p>
+                  </a:txBody>
+                  <a:tcPr/>
+                </a:tc>
+                <a:tc>
+                  <a:txBody>
+                    <a:bodyPr/>
+                    <a:lstStyle/>
+                    <a:p>
                       <a:r>
                         <a:rPr lang="es-ES" dirty="0"/>
                         <a:t>2 semanas</a:t>
@@ -11187,7 +11350,7 @@
                 </a:tc>
                 <a:extLst>
                   <a:ext uri="{0D108BD9-81ED-4DB2-BD59-A6C34878D82A}">
-                    <a16:rowId xmlns:a16="http://schemas.microsoft.com/office/drawing/2014/main" val="4179743263"/>
+                    <a16:rowId xmlns:a16="http://schemas.microsoft.com/office/drawing/2014/main" xmlns="" val="4179743263"/>
                   </a:ext>
                 </a:extLst>
               </a:tr>
@@ -11227,6 +11390,37 @@
                     <a:bodyPr/>
                     <a:lstStyle/>
                     <a:p>
+                      <a:pPr marL="0" marR="0" lvl="0" indent="0" algn="l" defTabSz="457200" rtl="0" eaLnBrk="1" fontAlgn="auto" latinLnBrk="0" hangingPunct="1">
+                        <a:lnSpc>
+                          <a:spcPct val="100000"/>
+                        </a:lnSpc>
+                        <a:spcBef>
+                          <a:spcPts val="0"/>
+                        </a:spcBef>
+                        <a:spcAft>
+                          <a:spcPts val="0"/>
+                        </a:spcAft>
+                        <a:buClrTx/>
+                        <a:buSzTx/>
+                        <a:buFontTx/>
+                        <a:buNone/>
+                        <a:tabLst/>
+                        <a:defRPr/>
+                      </a:pPr>
+                      <a:r>
+                        <a:rPr lang="es-ES" smtClean="0"/>
+                        <a:t>Manos finales</a:t>
+                      </a:r>
+                      <a:endParaRPr lang="es-ES" dirty="0"/>
+                    </a:p>
+                  </a:txBody>
+                  <a:tcPr/>
+                </a:tc>
+                <a:tc>
+                  <a:txBody>
+                    <a:bodyPr/>
+                    <a:lstStyle/>
+                    <a:p>
                       <a:r>
                         <a:rPr lang="es-ES" dirty="0"/>
                         <a:t>1 mes</a:t>
@@ -11250,7 +11444,7 @@
                 </a:tc>
                 <a:extLst>
                   <a:ext uri="{0D108BD9-81ED-4DB2-BD59-A6C34878D82A}">
-                    <a16:rowId xmlns:a16="http://schemas.microsoft.com/office/drawing/2014/main" val="1001260874"/>
+                    <a16:rowId xmlns:a16="http://schemas.microsoft.com/office/drawing/2014/main" xmlns="" val="1001260874"/>
                   </a:ext>
                 </a:extLst>
               </a:tr>
@@ -11293,7 +11487,7 @@
           <p:cNvPr id="2" name="Título 1">
             <a:extLst>
               <a:ext uri="{FF2B5EF4-FFF2-40B4-BE49-F238E27FC236}">
-                <a16:creationId xmlns:a16="http://schemas.microsoft.com/office/drawing/2014/main" id="{CFB5BFCC-2107-0DFB-A068-2BBD102A902A}"/>
+                <a16:creationId xmlns:a16="http://schemas.microsoft.com/office/drawing/2014/main" xmlns="" id="{CFB5BFCC-2107-0DFB-A068-2BBD102A902A}"/>
               </a:ext>
             </a:extLst>
           </p:cNvPr>
@@ -11328,7 +11522,7 @@
           <p:cNvPr id="15" name="Text Placeholder 2">
             <a:extLst>
               <a:ext uri="{FF2B5EF4-FFF2-40B4-BE49-F238E27FC236}">
-                <a16:creationId xmlns:a16="http://schemas.microsoft.com/office/drawing/2014/main" id="{6B8E4937-A71A-F6D8-48A1-84038C893128}"/>
+                <a16:creationId xmlns:a16="http://schemas.microsoft.com/office/drawing/2014/main" xmlns="" id="{6B8E4937-A71A-F6D8-48A1-84038C893128}"/>
               </a:ext>
             </a:extLst>
           </p:cNvPr>
@@ -11362,7 +11556,7 @@
           <p:cNvPr id="17" name="Content Placeholder 3">
             <a:extLst>
               <a:ext uri="{FF2B5EF4-FFF2-40B4-BE49-F238E27FC236}">
-                <a16:creationId xmlns:a16="http://schemas.microsoft.com/office/drawing/2014/main" id="{D0846E20-7171-924A-3312-27610FC73870}"/>
+                <a16:creationId xmlns:a16="http://schemas.microsoft.com/office/drawing/2014/main" xmlns="" id="{D0846E20-7171-924A-3312-27610FC73870}"/>
               </a:ext>
             </a:extLst>
           </p:cNvPr>
@@ -11459,7 +11653,7 @@
           <p:cNvPr id="19" name="Text Placeholder 4">
             <a:extLst>
               <a:ext uri="{FF2B5EF4-FFF2-40B4-BE49-F238E27FC236}">
-                <a16:creationId xmlns:a16="http://schemas.microsoft.com/office/drawing/2014/main" id="{4316A3DF-C36E-8EA9-2D3B-6723E8F0840F}"/>
+                <a16:creationId xmlns:a16="http://schemas.microsoft.com/office/drawing/2014/main" xmlns="" id="{4316A3DF-C36E-8EA9-2D3B-6723E8F0840F}"/>
               </a:ext>
             </a:extLst>
           </p:cNvPr>
@@ -11492,7 +11686,7 @@
           <p:cNvPr id="21" name="Content Placeholder 5">
             <a:extLst>
               <a:ext uri="{FF2B5EF4-FFF2-40B4-BE49-F238E27FC236}">
-                <a16:creationId xmlns:a16="http://schemas.microsoft.com/office/drawing/2014/main" id="{EF6F9626-C8AD-34B6-CAAE-F187DF00F1A3}"/>
+                <a16:creationId xmlns:a16="http://schemas.microsoft.com/office/drawing/2014/main" xmlns="" id="{EF6F9626-C8AD-34B6-CAAE-F187DF00F1A3}"/>
               </a:ext>
             </a:extLst>
           </p:cNvPr>

</xml_diff>